<commit_message>
Itro heading  in ppt:
</commit_message>
<xml_diff>
--- a/PodHandler.pptx
+++ b/PodHandler.pptx
@@ -15333,7 +15333,7 @@
               </a:lnSpc>
             </a:pPr>
             <a:r>
-              <a:rPr lang="en-IN" sz="4400" b="1" strike="noStrike" spc="-1">
+              <a:rPr lang="en-IN" sz="4400" b="1" strike="noStrike" spc="-1" dirty="0">
                 <a:solidFill>
                   <a:srgbClr val="000000"/>
                 </a:solidFill>
@@ -15346,7 +15346,7 @@
               </a:rPr>
               <a:t>Introduction</a:t>
             </a:r>
-            <a:endParaRPr lang="en-IN" sz="1800" b="0" strike="noStrike" spc="-1">
+            <a:endParaRPr lang="en-IN" sz="1800" b="0" strike="noStrike" spc="-1" dirty="0">
               <a:solidFill>
                 <a:srgbClr val="000000"/>
               </a:solidFill>
@@ -15514,21 +15514,7 @@
                 <a:spcPct val="100000"/>
               </a:lnSpc>
             </a:pPr>
-            <a:r>
-              <a:rPr lang="en-IN" sz="4400" b="1" strike="noStrike" spc="-1">
-                <a:solidFill>
-                  <a:srgbClr val="000000"/>
-                </a:solidFill>
-                <a:uFill>
-                  <a:solidFill>
-                    <a:srgbClr val="FFFFFF"/>
-                  </a:solidFill>
-                </a:uFill>
-                <a:latin typeface="Calibri"/>
-              </a:rPr>
-              <a:t>Introduction</a:t>
-            </a:r>
-            <a:endParaRPr lang="en-IN" sz="1800" b="0" strike="noStrike" spc="-1">
+            <a:endParaRPr lang="en-IN" sz="1800" b="0" strike="noStrike" spc="-1" dirty="0">
               <a:solidFill>
                 <a:srgbClr val="000000"/>
               </a:solidFill>
@@ -15574,7 +15560,7 @@
               <a:buChar char=""/>
             </a:pPr>
             <a:r>
-              <a:rPr lang="en-IN" sz="3200" b="0" strike="noStrike" spc="-1">
+              <a:rPr lang="en-IN" sz="3200" b="0" strike="noStrike" spc="-1" dirty="0">
                 <a:solidFill>
                   <a:srgbClr val="000000"/>
                 </a:solidFill>
@@ -15589,7 +15575,7 @@
               <a:t>There are number of data compression algorithms which use different approaches,</a:t>
             </a:r>
             <a:r>
-              <a:rPr lang="en-IN" sz="3200" b="0" strike="noStrike" spc="-1">
+              <a:rPr lang="en-IN" sz="3200" b="0" strike="noStrike" spc="-1" dirty="0">
                 <a:solidFill>
                   <a:srgbClr val="000000"/>
                 </a:solidFill>
@@ -15603,7 +15589,7 @@
               <a:t> in our project we will examine </a:t>
             </a:r>
             <a:r>
-              <a:rPr lang="en-IN" sz="3200" b="0" strike="noStrike" spc="-1">
+              <a:rPr lang="en-IN" sz="3200" b="0" strike="noStrike" spc="-1" dirty="0">
                 <a:solidFill>
                   <a:srgbClr val="000000"/>
                 </a:solidFill>
@@ -15617,7 +15603,7 @@
               </a:rPr>
               <a:t>lossless data compression algorithms like Huffman encoding algorithm, Lempel-Ziv-Welch algorithm, and Shannon-Fano algorithm and comparing their performance. </a:t>
             </a:r>
-            <a:endParaRPr lang="en-IN" sz="1800" b="0" strike="noStrike" spc="-1">
+            <a:endParaRPr lang="en-IN" sz="1800" b="0" strike="noStrike" spc="-1" dirty="0">
               <a:solidFill>
                 <a:srgbClr val="000000"/>
               </a:solidFill>

</xml_diff>